<commit_message>
Fixed High Level Schematic and edited README
</commit_message>
<xml_diff>
--- a/High level Schematic.pptx
+++ b/High level Schematic.pptx
@@ -259,7 +259,7 @@
           <a:p>
             <a:fld id="{98DC31B1-5BA1-4FD9-A9E3-6C9718F16FE3}" type="datetimeFigureOut">
               <a:rPr lang="en-US" smtClean="0"/>
-              <a:t>07/10/2018</a:t>
+              <a:t>08/11/2018</a:t>
             </a:fld>
             <a:endParaRPr lang="en-US"/>
           </a:p>
@@ -457,7 +457,7 @@
           <a:p>
             <a:fld id="{98DC31B1-5BA1-4FD9-A9E3-6C9718F16FE3}" type="datetimeFigureOut">
               <a:rPr lang="en-US" smtClean="0"/>
-              <a:t>07/10/2018</a:t>
+              <a:t>08/11/2018</a:t>
             </a:fld>
             <a:endParaRPr lang="en-US"/>
           </a:p>
@@ -665,7 +665,7 @@
           <a:p>
             <a:fld id="{98DC31B1-5BA1-4FD9-A9E3-6C9718F16FE3}" type="datetimeFigureOut">
               <a:rPr lang="en-US" smtClean="0"/>
-              <a:t>07/10/2018</a:t>
+              <a:t>08/11/2018</a:t>
             </a:fld>
             <a:endParaRPr lang="en-US"/>
           </a:p>
@@ -863,7 +863,7 @@
           <a:p>
             <a:fld id="{98DC31B1-5BA1-4FD9-A9E3-6C9718F16FE3}" type="datetimeFigureOut">
               <a:rPr lang="en-US" smtClean="0"/>
-              <a:t>07/10/2018</a:t>
+              <a:t>08/11/2018</a:t>
             </a:fld>
             <a:endParaRPr lang="en-US"/>
           </a:p>
@@ -1138,7 +1138,7 @@
           <a:p>
             <a:fld id="{98DC31B1-5BA1-4FD9-A9E3-6C9718F16FE3}" type="datetimeFigureOut">
               <a:rPr lang="en-US" smtClean="0"/>
-              <a:t>07/10/2018</a:t>
+              <a:t>08/11/2018</a:t>
             </a:fld>
             <a:endParaRPr lang="en-US"/>
           </a:p>
@@ -1403,7 +1403,7 @@
           <a:p>
             <a:fld id="{98DC31B1-5BA1-4FD9-A9E3-6C9718F16FE3}" type="datetimeFigureOut">
               <a:rPr lang="en-US" smtClean="0"/>
-              <a:t>07/10/2018</a:t>
+              <a:t>08/11/2018</a:t>
             </a:fld>
             <a:endParaRPr lang="en-US"/>
           </a:p>
@@ -1815,7 +1815,7 @@
           <a:p>
             <a:fld id="{98DC31B1-5BA1-4FD9-A9E3-6C9718F16FE3}" type="datetimeFigureOut">
               <a:rPr lang="en-US" smtClean="0"/>
-              <a:t>07/10/2018</a:t>
+              <a:t>08/11/2018</a:t>
             </a:fld>
             <a:endParaRPr lang="en-US"/>
           </a:p>
@@ -1956,7 +1956,7 @@
           <a:p>
             <a:fld id="{98DC31B1-5BA1-4FD9-A9E3-6C9718F16FE3}" type="datetimeFigureOut">
               <a:rPr lang="en-US" smtClean="0"/>
-              <a:t>07/10/2018</a:t>
+              <a:t>08/11/2018</a:t>
             </a:fld>
             <a:endParaRPr lang="en-US"/>
           </a:p>
@@ -2069,7 +2069,7 @@
           <a:p>
             <a:fld id="{98DC31B1-5BA1-4FD9-A9E3-6C9718F16FE3}" type="datetimeFigureOut">
               <a:rPr lang="en-US" smtClean="0"/>
-              <a:t>07/10/2018</a:t>
+              <a:t>08/11/2018</a:t>
             </a:fld>
             <a:endParaRPr lang="en-US"/>
           </a:p>
@@ -2380,7 +2380,7 @@
           <a:p>
             <a:fld id="{98DC31B1-5BA1-4FD9-A9E3-6C9718F16FE3}" type="datetimeFigureOut">
               <a:rPr lang="en-US" smtClean="0"/>
-              <a:t>07/10/2018</a:t>
+              <a:t>08/11/2018</a:t>
             </a:fld>
             <a:endParaRPr lang="en-US"/>
           </a:p>
@@ -2668,7 +2668,7 @@
           <a:p>
             <a:fld id="{98DC31B1-5BA1-4FD9-A9E3-6C9718F16FE3}" type="datetimeFigureOut">
               <a:rPr lang="en-US" smtClean="0"/>
-              <a:t>07/10/2018</a:t>
+              <a:t>08/11/2018</a:t>
             </a:fld>
             <a:endParaRPr lang="en-US"/>
           </a:p>
@@ -2909,7 +2909,7 @@
           <a:p>
             <a:fld id="{98DC31B1-5BA1-4FD9-A9E3-6C9718F16FE3}" type="datetimeFigureOut">
               <a:rPr lang="en-US" smtClean="0"/>
-              <a:t>07/10/2018</a:t>
+              <a:t>08/11/2018</a:t>
             </a:fld>
             <a:endParaRPr lang="en-US"/>
           </a:p>
@@ -3340,10 +3340,10 @@
         </p:nvGrpSpPr>
         <p:grpSpPr>
           <a:xfrm>
-            <a:off x="2328256" y="1986280"/>
-            <a:ext cx="7535487" cy="2885439"/>
+            <a:off x="2635827" y="1204884"/>
+            <a:ext cx="7535487" cy="3975250"/>
             <a:chOff x="1047404" y="622069"/>
-            <a:chExt cx="7535487" cy="2885439"/>
+            <a:chExt cx="7535487" cy="3975250"/>
           </a:xfrm>
         </p:grpSpPr>
         <p:sp>
@@ -3459,7 +3459,7 @@
           </p:nvSpPr>
           <p:spPr>
             <a:xfrm>
-              <a:off x="5999019" y="1974619"/>
+              <a:off x="5907645" y="2007003"/>
               <a:ext cx="1166552" cy="1330036"/>
             </a:xfrm>
             <a:prstGeom prst="rect">
@@ -3593,7 +3593,7 @@
           </p:nvSpPr>
           <p:spPr>
             <a:xfrm>
-              <a:off x="4402976" y="1974619"/>
+              <a:off x="2571923" y="1880063"/>
               <a:ext cx="922712" cy="1330036"/>
             </a:xfrm>
             <a:prstGeom prst="rect">
@@ -3629,7 +3629,7 @@
                     <a:schemeClr val="tx1"/>
                   </a:solidFill>
                 </a:rPr>
-                <a:t>V+</a:t>
+                <a:t>V+         </a:t>
               </a:r>
             </a:p>
             <a:p>
@@ -3777,7 +3777,7 @@
           </p:nvSpPr>
           <p:spPr>
             <a:xfrm>
-              <a:off x="2521528" y="2003366"/>
+              <a:off x="2317347" y="3674605"/>
               <a:ext cx="1330036" cy="922714"/>
             </a:xfrm>
             <a:prstGeom prst="rect">
@@ -3851,6 +3851,7 @@
               </a:extLst>
             </p:cNvPr>
             <p:cNvCxnSpPr>
+              <a:cxnSpLocks/>
               <a:stCxn id="4" idx="0"/>
             </p:cNvCxnSpPr>
             <p:nvPr/>
@@ -3891,57 +3892,20 @@
                 </a:ext>
               </a:extLst>
             </p:cNvPr>
-            <p:cNvCxnSpPr/>
+            <p:cNvCxnSpPr>
+              <a:cxnSpLocks/>
+            </p:cNvCxnSpPr>
             <p:nvPr/>
           </p:nvCxnSpPr>
           <p:spPr>
             <a:xfrm rot="16200000" flipH="1">
-              <a:off x="1717963" y="1399308"/>
-              <a:ext cx="1296786" cy="310343"/>
+              <a:off x="1737907" y="1379364"/>
+              <a:ext cx="1307295" cy="360740"/>
             </a:xfrm>
             <a:prstGeom prst="bentConnector3">
               <a:avLst>
-                <a:gd name="adj1" fmla="val 100000"/>
+                <a:gd name="adj1" fmla="val 100128"/>
               </a:avLst>
-            </a:prstGeom>
-            <a:ln>
-              <a:tailEnd type="triangle"/>
-            </a:ln>
-          </p:spPr>
-          <p:style>
-            <a:lnRef idx="1">
-              <a:schemeClr val="accent1"/>
-            </a:lnRef>
-            <a:fillRef idx="0">
-              <a:schemeClr val="accent1"/>
-            </a:fillRef>
-            <a:effectRef idx="0">
-              <a:schemeClr val="accent1"/>
-            </a:effectRef>
-            <a:fontRef idx="minor">
-              <a:schemeClr val="tx1"/>
-            </a:fontRef>
-          </p:style>
-        </p:cxnSp>
-        <p:cxnSp>
-          <p:nvCxnSpPr>
-            <p:cNvPr id="89" name="Connector: Elbow 88">
-              <a:extLst>
-                <a:ext uri="{FF2B5EF4-FFF2-40B4-BE49-F238E27FC236}">
-                  <a16:creationId xmlns:a16="http://schemas.microsoft.com/office/drawing/2014/main" id="{3DC30BA5-5DA0-4A42-ABD5-22124C2EF81D}"/>
-                </a:ext>
-              </a:extLst>
-            </p:cNvPr>
-            <p:cNvCxnSpPr/>
-            <p:nvPr/>
-          </p:nvCxnSpPr>
-          <p:spPr>
-            <a:xfrm>
-              <a:off x="3851564" y="2202873"/>
-              <a:ext cx="551412" cy="124691"/>
-            </a:xfrm>
-            <a:prstGeom prst="bentConnector3">
-              <a:avLst/>
             </a:prstGeom>
             <a:ln>
               <a:tailEnd type="triangle"/>
@@ -3971,13 +3935,15 @@
                 </a:ext>
               </a:extLst>
             </p:cNvPr>
-            <p:cNvCxnSpPr/>
+            <p:cNvCxnSpPr>
+              <a:cxnSpLocks/>
+            </p:cNvCxnSpPr>
             <p:nvPr/>
           </p:nvCxnSpPr>
           <p:spPr>
             <a:xfrm>
-              <a:off x="5325688" y="2818015"/>
-              <a:ext cx="673331" cy="108065"/>
+              <a:off x="3475652" y="2734268"/>
+              <a:ext cx="2396597" cy="166874"/>
             </a:xfrm>
             <a:prstGeom prst="bentConnector3">
               <a:avLst/>
@@ -4010,16 +3976,20 @@
                 </a:ext>
               </a:extLst>
             </p:cNvPr>
-            <p:cNvCxnSpPr/>
+            <p:cNvCxnSpPr>
+              <a:cxnSpLocks/>
+            </p:cNvCxnSpPr>
             <p:nvPr/>
           </p:nvCxnSpPr>
           <p:spPr>
             <a:xfrm rot="10800000">
-              <a:off x="5325689" y="2992583"/>
-              <a:ext cx="673331" cy="83127"/>
+              <a:off x="3475655" y="2933243"/>
+              <a:ext cx="2396595" cy="192345"/>
             </a:xfrm>
             <a:prstGeom prst="bentConnector3">
-              <a:avLst/>
+              <a:avLst>
+                <a:gd name="adj1" fmla="val 57631"/>
+              </a:avLst>
             </a:prstGeom>
             <a:ln>
               <a:tailEnd type="triangle"/>
@@ -4060,50 +4030,6 @@
             <a:prstGeom prst="bentConnector3">
               <a:avLst>
                 <a:gd name="adj1" fmla="val 989"/>
-              </a:avLst>
-            </a:prstGeom>
-            <a:ln>
-              <a:tailEnd type="triangle"/>
-            </a:ln>
-          </p:spPr>
-          <p:style>
-            <a:lnRef idx="1">
-              <a:schemeClr val="accent1"/>
-            </a:lnRef>
-            <a:fillRef idx="0">
-              <a:schemeClr val="accent1"/>
-            </a:fillRef>
-            <a:effectRef idx="0">
-              <a:schemeClr val="accent1"/>
-            </a:effectRef>
-            <a:fontRef idx="minor">
-              <a:schemeClr val="tx1"/>
-            </a:fontRef>
-          </p:style>
-        </p:cxnSp>
-        <p:cxnSp>
-          <p:nvCxnSpPr>
-            <p:cNvPr id="98" name="Connector: Elbow 97">
-              <a:extLst>
-                <a:ext uri="{FF2B5EF4-FFF2-40B4-BE49-F238E27FC236}">
-                  <a16:creationId xmlns:a16="http://schemas.microsoft.com/office/drawing/2014/main" id="{4EC7B907-7AE7-43FF-8BF8-F4BCC26531A7}"/>
-                </a:ext>
-              </a:extLst>
-            </p:cNvPr>
-            <p:cNvCxnSpPr>
-              <a:endCxn id="10" idx="2"/>
-            </p:cNvCxnSpPr>
-            <p:nvPr/>
-          </p:nvCxnSpPr>
-          <p:spPr>
-            <a:xfrm rot="10800000" flipV="1">
-              <a:off x="3186547" y="2202872"/>
-              <a:ext cx="3979025" cy="723207"/>
-            </a:xfrm>
-            <a:prstGeom prst="bentConnector4">
-              <a:avLst>
-                <a:gd name="adj1" fmla="val -7451"/>
-                <a:gd name="adj2" fmla="val 200575"/>
               </a:avLst>
             </a:prstGeom>
             <a:ln>
@@ -4680,179 +4606,6 @@
             </p:style>
           </p:cxnSp>
         </p:grpSp>
-        <p:grpSp>
-          <p:nvGrpSpPr>
-            <p:cNvPr id="139" name="Group 138">
-              <a:extLst>
-                <a:ext uri="{FF2B5EF4-FFF2-40B4-BE49-F238E27FC236}">
-                  <a16:creationId xmlns:a16="http://schemas.microsoft.com/office/drawing/2014/main" id="{C697C9B6-408E-4E68-B637-038FF0C719F6}"/>
-                </a:ext>
-              </a:extLst>
-            </p:cNvPr>
-            <p:cNvGrpSpPr/>
-            <p:nvPr/>
-          </p:nvGrpSpPr>
-          <p:grpSpPr>
-            <a:xfrm>
-              <a:off x="3889320" y="3209405"/>
-              <a:ext cx="262890" cy="190500"/>
-              <a:chOff x="7760970" y="807720"/>
-              <a:chExt cx="262890" cy="190500"/>
-            </a:xfrm>
-          </p:grpSpPr>
-          <p:cxnSp>
-            <p:nvCxnSpPr>
-              <p:cNvPr id="140" name="Straight Connector 139">
-                <a:extLst>
-                  <a:ext uri="{FF2B5EF4-FFF2-40B4-BE49-F238E27FC236}">
-                    <a16:creationId xmlns:a16="http://schemas.microsoft.com/office/drawing/2014/main" id="{715DFC97-3F4E-46CD-AB3D-E6BB401962A4}"/>
-                  </a:ext>
-                </a:extLst>
-              </p:cNvPr>
-              <p:cNvCxnSpPr>
-                <a:cxnSpLocks/>
-              </p:cNvCxnSpPr>
-              <p:nvPr/>
-            </p:nvCxnSpPr>
-            <p:spPr>
-              <a:xfrm>
-                <a:off x="7760970" y="933450"/>
-                <a:ext cx="262890" cy="0"/>
-              </a:xfrm>
-              <a:prstGeom prst="line">
-                <a:avLst/>
-              </a:prstGeom>
-            </p:spPr>
-            <p:style>
-              <a:lnRef idx="1">
-                <a:schemeClr val="accent1"/>
-              </a:lnRef>
-              <a:fillRef idx="0">
-                <a:schemeClr val="accent1"/>
-              </a:fillRef>
-              <a:effectRef idx="0">
-                <a:schemeClr val="accent1"/>
-              </a:effectRef>
-              <a:fontRef idx="minor">
-                <a:schemeClr val="tx1"/>
-              </a:fontRef>
-            </p:style>
-          </p:cxnSp>
-          <p:cxnSp>
-            <p:nvCxnSpPr>
-              <p:cNvPr id="141" name="Straight Connector 140">
-                <a:extLst>
-                  <a:ext uri="{FF2B5EF4-FFF2-40B4-BE49-F238E27FC236}">
-                    <a16:creationId xmlns:a16="http://schemas.microsoft.com/office/drawing/2014/main" id="{C1A5F789-FDFD-46B5-BC9C-A44B9BCB4A22}"/>
-                  </a:ext>
-                </a:extLst>
-              </p:cNvPr>
-              <p:cNvCxnSpPr>
-                <a:cxnSpLocks/>
-              </p:cNvCxnSpPr>
-              <p:nvPr/>
-            </p:nvCxnSpPr>
-            <p:spPr>
-              <a:xfrm>
-                <a:off x="7808595" y="965835"/>
-                <a:ext cx="171450" cy="0"/>
-              </a:xfrm>
-              <a:prstGeom prst="line">
-                <a:avLst/>
-              </a:prstGeom>
-            </p:spPr>
-            <p:style>
-              <a:lnRef idx="1">
-                <a:schemeClr val="accent1"/>
-              </a:lnRef>
-              <a:fillRef idx="0">
-                <a:schemeClr val="accent1"/>
-              </a:fillRef>
-              <a:effectRef idx="0">
-                <a:schemeClr val="accent1"/>
-              </a:effectRef>
-              <a:fontRef idx="minor">
-                <a:schemeClr val="tx1"/>
-              </a:fontRef>
-            </p:style>
-          </p:cxnSp>
-          <p:cxnSp>
-            <p:nvCxnSpPr>
-              <p:cNvPr id="142" name="Straight Connector 141">
-                <a:extLst>
-                  <a:ext uri="{FF2B5EF4-FFF2-40B4-BE49-F238E27FC236}">
-                    <a16:creationId xmlns:a16="http://schemas.microsoft.com/office/drawing/2014/main" id="{1FEF2916-9CFE-4EF4-A817-4BED527163A1}"/>
-                  </a:ext>
-                </a:extLst>
-              </p:cNvPr>
-              <p:cNvCxnSpPr>
-                <a:cxnSpLocks/>
-              </p:cNvCxnSpPr>
-              <p:nvPr/>
-            </p:nvCxnSpPr>
-            <p:spPr>
-              <a:xfrm>
-                <a:off x="7863840" y="998220"/>
-                <a:ext cx="68580" cy="0"/>
-              </a:xfrm>
-              <a:prstGeom prst="line">
-                <a:avLst/>
-              </a:prstGeom>
-            </p:spPr>
-            <p:style>
-              <a:lnRef idx="1">
-                <a:schemeClr val="accent1"/>
-              </a:lnRef>
-              <a:fillRef idx="0">
-                <a:schemeClr val="accent1"/>
-              </a:fillRef>
-              <a:effectRef idx="0">
-                <a:schemeClr val="accent1"/>
-              </a:effectRef>
-              <a:fontRef idx="minor">
-                <a:schemeClr val="tx1"/>
-              </a:fontRef>
-            </p:style>
-          </p:cxnSp>
-          <p:cxnSp>
-            <p:nvCxnSpPr>
-              <p:cNvPr id="143" name="Straight Connector 142">
-                <a:extLst>
-                  <a:ext uri="{FF2B5EF4-FFF2-40B4-BE49-F238E27FC236}">
-                    <a16:creationId xmlns:a16="http://schemas.microsoft.com/office/drawing/2014/main" id="{AEC3B313-15F1-48FC-BFE0-DE29A2AC7F76}"/>
-                  </a:ext>
-                </a:extLst>
-              </p:cNvPr>
-              <p:cNvCxnSpPr>
-                <a:cxnSpLocks/>
-              </p:cNvCxnSpPr>
-              <p:nvPr/>
-            </p:nvCxnSpPr>
-            <p:spPr>
-              <a:xfrm flipV="1">
-                <a:off x="7896225" y="807720"/>
-                <a:ext cx="0" cy="125731"/>
-              </a:xfrm>
-              <a:prstGeom prst="line">
-                <a:avLst/>
-              </a:prstGeom>
-            </p:spPr>
-            <p:style>
-              <a:lnRef idx="1">
-                <a:schemeClr val="accent1"/>
-              </a:lnRef>
-              <a:fillRef idx="0">
-                <a:schemeClr val="accent1"/>
-              </a:fillRef>
-              <a:effectRef idx="0">
-                <a:schemeClr val="accent1"/>
-              </a:effectRef>
-              <a:fontRef idx="minor">
-                <a:schemeClr val="tx1"/>
-              </a:fontRef>
-            </p:style>
-          </p:cxnSp>
-        </p:grpSp>
         <p:cxnSp>
           <p:nvCxnSpPr>
             <p:cNvPr id="147" name="Connector: Elbow 146">
@@ -4868,13 +4621,13 @@
             <p:nvPr/>
           </p:nvCxnSpPr>
           <p:spPr>
-            <a:xfrm flipV="1">
-              <a:off x="4020765" y="2992583"/>
-              <a:ext cx="382211" cy="216822"/>
+            <a:xfrm rot="5400000" flipH="1" flipV="1">
+              <a:off x="1856856" y="3149658"/>
+              <a:ext cx="959772" cy="462742"/>
             </a:xfrm>
             <a:prstGeom prst="bentConnector3">
               <a:avLst>
-                <a:gd name="adj1" fmla="val 657"/>
+                <a:gd name="adj1" fmla="val 101606"/>
               </a:avLst>
             </a:prstGeom>
           </p:spPr>
@@ -4894,6 +4647,277 @@
           </p:style>
         </p:cxnSp>
       </p:grpSp>
+      <p:cxnSp>
+        <p:nvCxnSpPr>
+          <p:cNvPr id="42" name="Straight Connector 41">
+            <a:extLst>
+              <a:ext uri="{FF2B5EF4-FFF2-40B4-BE49-F238E27FC236}">
+                <a16:creationId xmlns:a16="http://schemas.microsoft.com/office/drawing/2014/main" id="{FE84AA80-5A06-47AD-A531-2533B2886BB7}"/>
+              </a:ext>
+            </a:extLst>
+          </p:cNvPr>
+          <p:cNvCxnSpPr>
+            <a:cxnSpLocks/>
+          </p:cNvCxnSpPr>
+          <p:nvPr/>
+        </p:nvCxnSpPr>
+        <p:spPr>
+          <a:xfrm>
+            <a:off x="5505970" y="4569460"/>
+            <a:ext cx="262890" cy="0"/>
+          </a:xfrm>
+          <a:prstGeom prst="line">
+            <a:avLst/>
+          </a:prstGeom>
+        </p:spPr>
+        <p:style>
+          <a:lnRef idx="1">
+            <a:schemeClr val="accent1"/>
+          </a:lnRef>
+          <a:fillRef idx="0">
+            <a:schemeClr val="accent1"/>
+          </a:fillRef>
+          <a:effectRef idx="0">
+            <a:schemeClr val="accent1"/>
+          </a:effectRef>
+          <a:fontRef idx="minor">
+            <a:schemeClr val="tx1"/>
+          </a:fontRef>
+        </p:style>
+      </p:cxnSp>
+      <p:cxnSp>
+        <p:nvCxnSpPr>
+          <p:cNvPr id="43" name="Straight Connector 42">
+            <a:extLst>
+              <a:ext uri="{FF2B5EF4-FFF2-40B4-BE49-F238E27FC236}">
+                <a16:creationId xmlns:a16="http://schemas.microsoft.com/office/drawing/2014/main" id="{78BC7768-00FC-4532-B8A5-775E267A0CB4}"/>
+              </a:ext>
+            </a:extLst>
+          </p:cNvPr>
+          <p:cNvCxnSpPr>
+            <a:cxnSpLocks/>
+          </p:cNvCxnSpPr>
+          <p:nvPr/>
+        </p:nvCxnSpPr>
+        <p:spPr>
+          <a:xfrm>
+            <a:off x="5553595" y="4601845"/>
+            <a:ext cx="171450" cy="0"/>
+          </a:xfrm>
+          <a:prstGeom prst="line">
+            <a:avLst/>
+          </a:prstGeom>
+        </p:spPr>
+        <p:style>
+          <a:lnRef idx="1">
+            <a:schemeClr val="accent1"/>
+          </a:lnRef>
+          <a:fillRef idx="0">
+            <a:schemeClr val="accent1"/>
+          </a:fillRef>
+          <a:effectRef idx="0">
+            <a:schemeClr val="accent1"/>
+          </a:effectRef>
+          <a:fontRef idx="minor">
+            <a:schemeClr val="tx1"/>
+          </a:fontRef>
+        </p:style>
+      </p:cxnSp>
+      <p:cxnSp>
+        <p:nvCxnSpPr>
+          <p:cNvPr id="44" name="Straight Connector 43">
+            <a:extLst>
+              <a:ext uri="{FF2B5EF4-FFF2-40B4-BE49-F238E27FC236}">
+                <a16:creationId xmlns:a16="http://schemas.microsoft.com/office/drawing/2014/main" id="{081207B0-7522-4910-B284-48F443543552}"/>
+              </a:ext>
+            </a:extLst>
+          </p:cNvPr>
+          <p:cNvCxnSpPr>
+            <a:cxnSpLocks/>
+          </p:cNvCxnSpPr>
+          <p:nvPr/>
+        </p:nvCxnSpPr>
+        <p:spPr>
+          <a:xfrm>
+            <a:off x="5608840" y="4634230"/>
+            <a:ext cx="68580" cy="0"/>
+          </a:xfrm>
+          <a:prstGeom prst="line">
+            <a:avLst/>
+          </a:prstGeom>
+        </p:spPr>
+        <p:style>
+          <a:lnRef idx="1">
+            <a:schemeClr val="accent1"/>
+          </a:lnRef>
+          <a:fillRef idx="0">
+            <a:schemeClr val="accent1"/>
+          </a:fillRef>
+          <a:effectRef idx="0">
+            <a:schemeClr val="accent1"/>
+          </a:effectRef>
+          <a:fontRef idx="minor">
+            <a:schemeClr val="tx1"/>
+          </a:fontRef>
+        </p:style>
+      </p:cxnSp>
+      <p:cxnSp>
+        <p:nvCxnSpPr>
+          <p:cNvPr id="45" name="Straight Connector 44">
+            <a:extLst>
+              <a:ext uri="{FF2B5EF4-FFF2-40B4-BE49-F238E27FC236}">
+                <a16:creationId xmlns:a16="http://schemas.microsoft.com/office/drawing/2014/main" id="{3A4CEC86-7452-4BB9-AA2B-483F6C45C07D}"/>
+              </a:ext>
+            </a:extLst>
+          </p:cNvPr>
+          <p:cNvCxnSpPr>
+            <a:cxnSpLocks/>
+          </p:cNvCxnSpPr>
+          <p:nvPr/>
+        </p:nvCxnSpPr>
+        <p:spPr>
+          <a:xfrm flipV="1">
+            <a:off x="5641225" y="4443730"/>
+            <a:ext cx="0" cy="125731"/>
+          </a:xfrm>
+          <a:prstGeom prst="line">
+            <a:avLst/>
+          </a:prstGeom>
+        </p:spPr>
+        <p:style>
+          <a:lnRef idx="1">
+            <a:schemeClr val="accent1"/>
+          </a:lnRef>
+          <a:fillRef idx="0">
+            <a:schemeClr val="accent1"/>
+          </a:fillRef>
+          <a:effectRef idx="0">
+            <a:schemeClr val="accent1"/>
+          </a:effectRef>
+          <a:fontRef idx="minor">
+            <a:schemeClr val="tx1"/>
+          </a:fontRef>
+        </p:style>
+      </p:cxnSp>
+      <p:cxnSp>
+        <p:nvCxnSpPr>
+          <p:cNvPr id="18" name="Straight Arrow Connector 17">
+            <a:extLst>
+              <a:ext uri="{FF2B5EF4-FFF2-40B4-BE49-F238E27FC236}">
+                <a16:creationId xmlns:a16="http://schemas.microsoft.com/office/drawing/2014/main" id="{A50D638F-926E-4455-9291-4A019343C92A}"/>
+              </a:ext>
+            </a:extLst>
+          </p:cNvPr>
+          <p:cNvCxnSpPr/>
+          <p:nvPr/>
+        </p:nvCxnSpPr>
+        <p:spPr>
+          <a:xfrm>
+            <a:off x="3693794" y="4443730"/>
+            <a:ext cx="216738" cy="0"/>
+          </a:xfrm>
+          <a:prstGeom prst="straightConnector1">
+            <a:avLst/>
+          </a:prstGeom>
+          <a:ln>
+            <a:tailEnd type="triangle"/>
+          </a:ln>
+        </p:spPr>
+        <p:style>
+          <a:lnRef idx="1">
+            <a:schemeClr val="accent1"/>
+          </a:lnRef>
+          <a:fillRef idx="0">
+            <a:schemeClr val="accent1"/>
+          </a:fillRef>
+          <a:effectRef idx="0">
+            <a:schemeClr val="accent1"/>
+          </a:effectRef>
+          <a:fontRef idx="minor">
+            <a:schemeClr val="tx1"/>
+          </a:fontRef>
+        </p:style>
+      </p:cxnSp>
+      <p:cxnSp>
+        <p:nvCxnSpPr>
+          <p:cNvPr id="23" name="Straight Connector 22">
+            <a:extLst>
+              <a:ext uri="{FF2B5EF4-FFF2-40B4-BE49-F238E27FC236}">
+                <a16:creationId xmlns:a16="http://schemas.microsoft.com/office/drawing/2014/main" id="{DC85F87E-5784-4049-B4D8-56BF4E64D441}"/>
+              </a:ext>
+            </a:extLst>
+          </p:cNvPr>
+          <p:cNvCxnSpPr/>
+          <p:nvPr/>
+        </p:nvCxnSpPr>
+        <p:spPr>
+          <a:xfrm>
+            <a:off x="5235806" y="4443730"/>
+            <a:ext cx="401609" cy="0"/>
+          </a:xfrm>
+          <a:prstGeom prst="line">
+            <a:avLst/>
+          </a:prstGeom>
+        </p:spPr>
+        <p:style>
+          <a:lnRef idx="1">
+            <a:schemeClr val="accent1"/>
+          </a:lnRef>
+          <a:fillRef idx="0">
+            <a:schemeClr val="accent1"/>
+          </a:fillRef>
+          <a:effectRef idx="0">
+            <a:schemeClr val="accent1"/>
+          </a:effectRef>
+          <a:fontRef idx="minor">
+            <a:schemeClr val="tx1"/>
+          </a:fontRef>
+        </p:style>
+      </p:cxnSp>
+      <p:cxnSp>
+        <p:nvCxnSpPr>
+          <p:cNvPr id="25" name="Connector: Elbow 24">
+            <a:extLst>
+              <a:ext uri="{FF2B5EF4-FFF2-40B4-BE49-F238E27FC236}">
+                <a16:creationId xmlns:a16="http://schemas.microsoft.com/office/drawing/2014/main" id="{7E25417C-4D42-497E-A52A-63BBCCC2915D}"/>
+              </a:ext>
+            </a:extLst>
+          </p:cNvPr>
+          <p:cNvCxnSpPr>
+            <a:endCxn id="10" idx="2"/>
+          </p:cNvCxnSpPr>
+          <p:nvPr/>
+        </p:nvCxnSpPr>
+        <p:spPr>
+          <a:xfrm rot="10800000" flipV="1">
+            <a:off x="4570788" y="2796196"/>
+            <a:ext cx="4091832" cy="2383937"/>
+          </a:xfrm>
+          <a:prstGeom prst="bentConnector4">
+            <a:avLst>
+              <a:gd name="adj1" fmla="val -9524"/>
+              <a:gd name="adj2" fmla="val 109589"/>
+            </a:avLst>
+          </a:prstGeom>
+          <a:ln>
+            <a:tailEnd type="triangle"/>
+          </a:ln>
+        </p:spPr>
+        <p:style>
+          <a:lnRef idx="1">
+            <a:schemeClr val="accent1"/>
+          </a:lnRef>
+          <a:fillRef idx="0">
+            <a:schemeClr val="accent1"/>
+          </a:fillRef>
+          <a:effectRef idx="0">
+            <a:schemeClr val="accent1"/>
+          </a:effectRef>
+          <a:fontRef idx="minor">
+            <a:schemeClr val="tx1"/>
+          </a:fontRef>
+        </p:style>
+      </p:cxnSp>
     </p:spTree>
     <p:extLst>
       <p:ext uri="{BB962C8B-B14F-4D97-AF65-F5344CB8AC3E}">

</xml_diff>